<commit_message>
final edits, export to pdf
</commit_message>
<xml_diff>
--- a/Tutorials/KurtisSpring2020Poster.pptx
+++ b/Tutorials/KurtisSpring2020Poster.pptx
@@ -5115,7 +5115,7 @@
           <a:p>
             <a:r>
               <a:rPr lang="en-US" dirty="0"/>
-              <a:t>The end Product</a:t>
+              <a:t>The End Product</a:t>
             </a:r>
           </a:p>
         </p:txBody>
@@ -5977,7 +5977,7 @@
         <p:spPr>
           <a:xfrm>
             <a:off x="15544798" y="17099280"/>
-            <a:ext cx="12712751" cy="7478970"/>
+            <a:ext cx="12712751" cy="9325630"/>
           </a:xfrm>
           <a:prstGeom prst="rect">
             <a:avLst/>
@@ -6007,6 +6007,16 @@
             <a:r>
               <a:rPr lang="en-US" sz="6000" dirty="0"/>
               <a:t>Make a tutorial teaching about SLAM and how to use and manipulate SLAM</a:t>
+            </a:r>
+          </a:p>
+          <a:p>
+            <a:pPr marL="857250" indent="-857250">
+              <a:buFont typeface="Arial" panose="020B0604020202020204" pitchFamily="34" charset="0"/>
+              <a:buChar char="•"/>
+            </a:pPr>
+            <a:r>
+              <a:rPr lang="en-US" sz="6000" dirty="0"/>
+              <a:t>Implement in real life with iRobot Create (Roomba)</a:t>
             </a:r>
           </a:p>
           <a:p>
@@ -6672,6 +6682,42 @@
           <a:xfrm>
             <a:off x="30086347" y="16335020"/>
             <a:ext cx="13032252" cy="8152283"/>
+          </a:xfrm>
+          <a:prstGeom prst="rect">
+            <a:avLst/>
+          </a:prstGeom>
+        </p:spPr>
+      </p:pic>
+      <p:pic>
+        <p:nvPicPr>
+          <p:cNvPr id="7" name="Picture 6" descr="A picture containing food&#10;&#10;Description automatically generated">
+            <a:extLst>
+              <a:ext uri="{FF2B5EF4-FFF2-40B4-BE49-F238E27FC236}">
+                <a16:creationId xmlns:a16="http://schemas.microsoft.com/office/drawing/2014/main" id="{597585A6-8A73-451A-BB6A-A0A27890D524}"/>
+              </a:ext>
+            </a:extLst>
+          </p:cNvPr>
+          <p:cNvPicPr>
+            <a:picLocks noChangeAspect="1"/>
+          </p:cNvPicPr>
+          <p:nvPr/>
+        </p:nvPicPr>
+        <p:blipFill>
+          <a:blip r:embed="rId8" cstate="print">
+            <a:extLst>
+              <a:ext uri="{28A0092B-C50C-407E-A947-70E740481C1C}">
+                <a14:useLocalDpi xmlns:a14="http://schemas.microsoft.com/office/drawing/2010/main" val="0"/>
+              </a:ext>
+            </a:extLst>
+          </a:blip>
+          <a:stretch>
+            <a:fillRect/>
+          </a:stretch>
+        </p:blipFill>
+        <p:spPr>
+          <a:xfrm>
+            <a:off x="35430603" y="311689"/>
+            <a:ext cx="4519966" cy="3077344"/>
           </a:xfrm>
           <a:prstGeom prst="rect">
             <a:avLst/>

</xml_diff>